<commit_message>
updated process one pager
</commit_message>
<xml_diff>
--- a/apps/mcp/src/mcp_server/tools/e18_utility_toolkit/assets/e18-process-one-pager-template.pptx
+++ b/apps/mcp/src/mcp_server/tools/e18_utility_toolkit/assets/e18-process-one-pager-template.pptx
@@ -5677,7 +5677,7 @@
         </p:blipFill>
         <p:spPr>
           <a:xfrm>
-            <a:off x="7732411" y="304750"/>
+            <a:off x="8016524" y="303335"/>
             <a:ext cx="799303" cy="438131"/>
           </a:xfrm>
           <a:prstGeom prst="rect">
@@ -5697,8 +5697,8 @@
         </p:nvSpPr>
         <p:spPr>
           <a:xfrm>
-            <a:off x="7041550" y="695450"/>
-            <a:ext cx="1568400" cy="417900"/>
+            <a:off x="7294513" y="694035"/>
+            <a:ext cx="1599550" cy="402836"/>
           </a:xfrm>
           <a:prstGeom prst="rect">
             <a:avLst/>
@@ -5724,7 +5724,7 @@
               <a:buNone/>
             </a:pPr>
             <a:r>
-              <a:rPr lang="en-GB" sz="848">
+              <a:rPr lang="en-GB" sz="800" dirty="0">
                 <a:solidFill>
                   <a:srgbClr val="1C5CB1"/>
                 </a:solidFill>
@@ -5735,7 +5735,7 @@
               </a:rPr>
               <a:t>[NHS Org Name Placeholder]</a:t>
             </a:r>
-            <a:endParaRPr sz="848">
+            <a:endParaRPr sz="800" dirty="0">
               <a:solidFill>
                 <a:srgbClr val="1C5CB1"/>
               </a:solidFill>
@@ -5801,8 +5801,8 @@
         </p:nvSpPr>
         <p:spPr>
           <a:xfrm>
-            <a:off x="152400" y="1029975"/>
-            <a:ext cx="5432241" cy="551400"/>
+            <a:off x="155986" y="1007024"/>
+            <a:ext cx="5400000" cy="432000"/>
           </a:xfrm>
           <a:prstGeom prst="rect">
             <a:avLst/>
@@ -5828,7 +5828,7 @@
               <a:buNone/>
             </a:pPr>
             <a:r>
-              <a:rPr lang="en-GB" dirty="0">
+              <a:rPr lang="en-GB" sz="1200" dirty="0">
                 <a:solidFill>
                   <a:schemeClr val="lt1"/>
                 </a:solidFill>
@@ -5839,7 +5839,7 @@
               </a:rPr>
               <a:t>[Headline Statement Placeholder]</a:t>
             </a:r>
-            <a:endParaRPr dirty="0">
+            <a:endParaRPr sz="1200" dirty="0">
               <a:solidFill>
                 <a:schemeClr val="lt1"/>
               </a:solidFill>
@@ -5859,8 +5859,8 @@
         </p:nvSpPr>
         <p:spPr>
           <a:xfrm>
-            <a:off x="162100" y="1304522"/>
-            <a:ext cx="5187000" cy="287100"/>
+            <a:off x="155002" y="1239125"/>
+            <a:ext cx="5400000" cy="432000"/>
           </a:xfrm>
           <a:prstGeom prst="rect">
             <a:avLst/>
@@ -5886,7 +5886,7 @@
               <a:buNone/>
             </a:pPr>
             <a:r>
-              <a:rPr lang="en-GB" sz="1000">
+              <a:rPr lang="en-GB" sz="1000" dirty="0">
                 <a:solidFill>
                   <a:schemeClr val="lt2"/>
                 </a:solidFill>
@@ -5897,7 +5897,7 @@
               </a:rPr>
               <a:t>Process Name: [Waiting List Validation]</a:t>
             </a:r>
-            <a:endParaRPr sz="1000">
+            <a:endParaRPr sz="1000" dirty="0">
               <a:solidFill>
                 <a:schemeClr val="lt2"/>
               </a:solidFill>
@@ -5917,8 +5917,8 @@
         </p:nvSpPr>
         <p:spPr>
           <a:xfrm>
-            <a:off x="5513100" y="978325"/>
-            <a:ext cx="3172200" cy="375300"/>
+            <a:off x="5570224" y="1010929"/>
+            <a:ext cx="3362656" cy="432000"/>
           </a:xfrm>
           <a:prstGeom prst="rect">
             <a:avLst/>
@@ -5944,7 +5944,7 @@
               <a:buNone/>
             </a:pPr>
             <a:r>
-              <a:rPr lang="en-GB">
+              <a:rPr lang="en-GB" sz="1200" dirty="0">
                 <a:solidFill>
                   <a:srgbClr val="AB11B7"/>
                 </a:solidFill>
@@ -5955,7 +5955,7 @@
               </a:rPr>
               <a:t>[Process Category Placeholder]</a:t>
             </a:r>
-            <a:endParaRPr>
+            <a:endParaRPr sz="1200" dirty="0">
               <a:solidFill>
                 <a:srgbClr val="AB11B7"/>
               </a:solidFill>
@@ -5975,8 +5975,8 @@
         </p:nvSpPr>
         <p:spPr>
           <a:xfrm>
-            <a:off x="5740025" y="1304525"/>
-            <a:ext cx="2944800" cy="287100"/>
+            <a:off x="5688854" y="1244964"/>
+            <a:ext cx="3240000" cy="432000"/>
           </a:xfrm>
           <a:prstGeom prst="rect">
             <a:avLst/>
@@ -6002,7 +6002,7 @@
               <a:buNone/>
             </a:pPr>
             <a:r>
-              <a:rPr lang="en-GB" sz="1000">
+              <a:rPr lang="en-GB" sz="1000" dirty="0">
                 <a:solidFill>
                   <a:schemeClr val="accent3"/>
                 </a:solidFill>
@@ -6013,7 +6013,7 @@
               </a:rPr>
               <a:t>Systems Used: [PAS | RADAR | Patient Hub]</a:t>
             </a:r>
-            <a:endParaRPr sz="1000">
+            <a:endParaRPr sz="1000" dirty="0">
               <a:solidFill>
                 <a:schemeClr val="accent3"/>
               </a:solidFill>

</xml_diff>